<commit_message>
pdf y pptx para presentacion 26-5-21
</commit_message>
<xml_diff>
--- a/Presentacion Super Meat Boy.pptx
+++ b/Presentacion Super Meat Boy.pptx
@@ -8,9 +8,9 @@
     <p:sldId id="256" r:id="rId5"/>
     <p:sldId id="259" r:id="rId6"/>
     <p:sldId id="257" r:id="rId7"/>
-    <p:sldId id="267" r:id="rId8"/>
-    <p:sldId id="258" r:id="rId9"/>
-    <p:sldId id="268" r:id="rId10"/>
+    <p:sldId id="268" r:id="rId8"/>
+    <p:sldId id="267" r:id="rId9"/>
+    <p:sldId id="258" r:id="rId10"/>
     <p:sldId id="260" r:id="rId11"/>
     <p:sldId id="261" r:id="rId12"/>
     <p:sldId id="262" r:id="rId13"/>
@@ -4785,6 +4785,16 @@
                   <a:schemeClr val="bg1"/>
                 </a:solidFill>
               </a:rPr>
+              <a:t>Personajes</a:t>
+            </a:r>
+          </a:p>
+          <a:p>
+            <a:r>
+              <a:rPr lang="es-ES" sz="2400" dirty="0">
+                <a:solidFill>
+                  <a:schemeClr val="bg1"/>
+                </a:solidFill>
+              </a:rPr>
               <a:t>Escenarios</a:t>
             </a:r>
           </a:p>
@@ -4796,16 +4806,6 @@
                 </a:solidFill>
               </a:rPr>
               <a:t>Mecánicas principales</a:t>
-            </a:r>
-          </a:p>
-          <a:p>
-            <a:r>
-              <a:rPr lang="es-ES" sz="2400" dirty="0">
-                <a:solidFill>
-                  <a:schemeClr val="bg1"/>
-                </a:solidFill>
-              </a:rPr>
-              <a:t>Personajes</a:t>
             </a:r>
           </a:p>
           <a:p>
@@ -5239,6 +5239,415 @@
           <p:cNvPr id="2" name="Título 1">
             <a:extLst>
               <a:ext uri="{FF2B5EF4-FFF2-40B4-BE49-F238E27FC236}">
+                <a16:creationId xmlns:a16="http://schemas.microsoft.com/office/drawing/2014/main" id="{919C7AAA-C93C-435F-89C9-BBC0E4327853}"/>
+              </a:ext>
+            </a:extLst>
+          </p:cNvPr>
+          <p:cNvSpPr>
+            <a:spLocks noGrp="1"/>
+          </p:cNvSpPr>
+          <p:nvPr>
+            <p:ph type="title"/>
+          </p:nvPr>
+        </p:nvSpPr>
+        <p:spPr/>
+        <p:txBody>
+          <a:bodyPr/>
+          <a:lstStyle/>
+          <a:p>
+            <a:r>
+              <a:rPr lang="es-ES" dirty="0">
+                <a:solidFill>
+                  <a:schemeClr val="bg1"/>
+                </a:solidFill>
+                <a:latin typeface="Stencil" panose="040409050D0802020404" pitchFamily="82" charset="0"/>
+              </a:rPr>
+              <a:t>Personajes</a:t>
+            </a:r>
+            <a:endParaRPr lang="es-ES" dirty="0"/>
+          </a:p>
+        </p:txBody>
+      </p:sp>
+      <p:sp>
+        <p:nvSpPr>
+          <p:cNvPr id="3" name="Marcador de contenido 2">
+            <a:extLst>
+              <a:ext uri="{FF2B5EF4-FFF2-40B4-BE49-F238E27FC236}">
+                <a16:creationId xmlns:a16="http://schemas.microsoft.com/office/drawing/2014/main" id="{42342C9F-20EE-4721-BBE8-737BC53A3F82}"/>
+              </a:ext>
+            </a:extLst>
+          </p:cNvPr>
+          <p:cNvSpPr>
+            <a:spLocks noGrp="1"/>
+          </p:cNvSpPr>
+          <p:nvPr>
+            <p:ph idx="1"/>
+          </p:nvPr>
+        </p:nvSpPr>
+        <p:spPr/>
+        <p:txBody>
+          <a:bodyPr>
+            <a:normAutofit/>
+          </a:bodyPr>
+          <a:lstStyle/>
+          <a:p>
+            <a:pPr marL="0" indent="0">
+              <a:buNone/>
+            </a:pPr>
+            <a:r>
+              <a:rPr lang="es-ES" sz="2400" dirty="0">
+                <a:solidFill>
+                  <a:schemeClr val="bg1"/>
+                </a:solidFill>
+              </a:rPr>
+              <a:t>        </a:t>
+            </a:r>
+            <a:r>
+              <a:rPr lang="es-ES" sz="2400" b="1" dirty="0">
+                <a:solidFill>
+                  <a:schemeClr val="bg1"/>
+                </a:solidFill>
+              </a:rPr>
+              <a:t>MEAT BOY</a:t>
+            </a:r>
+          </a:p>
+          <a:p>
+            <a:pPr marL="0" indent="0">
+              <a:buNone/>
+            </a:pPr>
+            <a:endParaRPr lang="es-ES" sz="2400" dirty="0">
+              <a:solidFill>
+                <a:schemeClr val="bg1"/>
+              </a:solidFill>
+            </a:endParaRPr>
+          </a:p>
+          <a:p>
+            <a:pPr marL="0" indent="0">
+              <a:buNone/>
+            </a:pPr>
+            <a:r>
+              <a:rPr lang="es-ES" sz="2400" dirty="0">
+                <a:solidFill>
+                  <a:schemeClr val="bg1"/>
+                </a:solidFill>
+              </a:rPr>
+              <a:t>				           </a:t>
+            </a:r>
+            <a:r>
+              <a:rPr lang="es-ES" sz="2400" b="1" dirty="0">
+                <a:solidFill>
+                  <a:schemeClr val="bg1"/>
+                </a:solidFill>
+              </a:rPr>
+              <a:t>BANDAGE GIRL</a:t>
+            </a:r>
+          </a:p>
+          <a:p>
+            <a:pPr marL="0" indent="0">
+              <a:buNone/>
+            </a:pPr>
+            <a:r>
+              <a:rPr lang="es-ES" sz="2400" dirty="0">
+                <a:solidFill>
+                  <a:schemeClr val="bg1"/>
+                </a:solidFill>
+              </a:rPr>
+              <a:t>						</a:t>
+            </a:r>
+          </a:p>
+          <a:p>
+            <a:pPr marL="0" indent="0">
+              <a:buNone/>
+            </a:pPr>
+            <a:r>
+              <a:rPr lang="es-ES" sz="2400" dirty="0">
+                <a:solidFill>
+                  <a:schemeClr val="bg1"/>
+                </a:solidFill>
+              </a:rPr>
+              <a:t>									     </a:t>
+            </a:r>
+            <a:r>
+              <a:rPr lang="es-ES" sz="2400" b="1" dirty="0">
+                <a:solidFill>
+                  <a:schemeClr val="bg1"/>
+                </a:solidFill>
+              </a:rPr>
+              <a:t>DR. FETUS</a:t>
+            </a:r>
+          </a:p>
+        </p:txBody>
+      </p:sp>
+      <p:pic>
+        <p:nvPicPr>
+          <p:cNvPr id="5" name="Imagen 4">
+            <a:extLst>
+              <a:ext uri="{FF2B5EF4-FFF2-40B4-BE49-F238E27FC236}">
+                <a16:creationId xmlns:a16="http://schemas.microsoft.com/office/drawing/2014/main" id="{7B1E86C4-78BE-4C2D-B464-31910B502DA2}"/>
+              </a:ext>
+            </a:extLst>
+          </p:cNvPr>
+          <p:cNvPicPr>
+            <a:picLocks noChangeAspect="1"/>
+          </p:cNvPicPr>
+          <p:nvPr/>
+        </p:nvPicPr>
+        <p:blipFill>
+          <a:blip r:embed="rId2">
+            <a:extLst>
+              <a:ext uri="{28A0092B-C50C-407E-A947-70E740481C1C}">
+                <a14:useLocalDpi xmlns:a14="http://schemas.microsoft.com/office/drawing/2010/main" val="0"/>
+              </a:ext>
+            </a:extLst>
+          </a:blip>
+          <a:stretch>
+            <a:fillRect/>
+          </a:stretch>
+        </p:blipFill>
+        <p:spPr>
+          <a:xfrm>
+            <a:off x="5925368" y="3206694"/>
+            <a:ext cx="1401923" cy="1359654"/>
+          </a:xfrm>
+          <a:prstGeom prst="rect">
+            <a:avLst/>
+          </a:prstGeom>
+        </p:spPr>
+      </p:pic>
+      <p:pic>
+        <p:nvPicPr>
+          <p:cNvPr id="1028" name="Picture 4" descr="Dr. Fetus">
+            <a:extLst>
+              <a:ext uri="{FF2B5EF4-FFF2-40B4-BE49-F238E27FC236}">
+                <a16:creationId xmlns:a16="http://schemas.microsoft.com/office/drawing/2014/main" id="{4E6EFF35-3741-4833-B37E-736A52411728}"/>
+              </a:ext>
+            </a:extLst>
+          </p:cNvPr>
+          <p:cNvPicPr>
+            <a:picLocks noChangeAspect="1" noChangeArrowheads="1"/>
+          </p:cNvPicPr>
+          <p:nvPr/>
+        </p:nvPicPr>
+        <p:blipFill>
+          <a:blip r:embed="rId3">
+            <a:extLst>
+              <a:ext uri="{28A0092B-C50C-407E-A947-70E740481C1C}">
+                <a14:useLocalDpi xmlns:a14="http://schemas.microsoft.com/office/drawing/2010/main" val="0"/>
+              </a:ext>
+            </a:extLst>
+          </a:blip>
+          <a:srcRect/>
+          <a:stretch>
+            <a:fillRect/>
+          </a:stretch>
+        </p:blipFill>
+        <p:spPr bwMode="auto">
+          <a:xfrm>
+            <a:off x="9645791" y="4254311"/>
+            <a:ext cx="1619625" cy="1619625"/>
+          </a:xfrm>
+          <a:prstGeom prst="rect">
+            <a:avLst/>
+          </a:prstGeom>
+          <a:noFill/>
+          <a:extLst>
+            <a:ext uri="{909E8E84-426E-40DD-AFC4-6F175D3DCCD1}">
+              <a14:hiddenFill xmlns:a14="http://schemas.microsoft.com/office/drawing/2010/main">
+                <a:solidFill>
+                  <a:srgbClr val="FFFFFF"/>
+                </a:solidFill>
+              </a14:hiddenFill>
+            </a:ext>
+          </a:extLst>
+        </p:spPr>
+      </p:pic>
+      <p:pic>
+        <p:nvPicPr>
+          <p:cNvPr id="8" name="Picture 2">
+            <a:extLst>
+              <a:ext uri="{FF2B5EF4-FFF2-40B4-BE49-F238E27FC236}">
+                <a16:creationId xmlns:a16="http://schemas.microsoft.com/office/drawing/2014/main" id="{7264CC92-1D3F-4A05-A377-1FEFE0585C90}"/>
+              </a:ext>
+            </a:extLst>
+          </p:cNvPr>
+          <p:cNvPicPr>
+            <a:picLocks noChangeAspect="1" noChangeArrowheads="1"/>
+          </p:cNvPicPr>
+          <p:nvPr/>
+        </p:nvPicPr>
+        <p:blipFill>
+          <a:blip r:embed="rId4">
+            <a:extLst>
+              <a:ext uri="{28A0092B-C50C-407E-A947-70E740481C1C}">
+                <a14:useLocalDpi xmlns:a14="http://schemas.microsoft.com/office/drawing/2010/main" val="0"/>
+              </a:ext>
+            </a:extLst>
+          </a:blip>
+          <a:srcRect/>
+          <a:stretch>
+            <a:fillRect/>
+          </a:stretch>
+        </p:blipFill>
+        <p:spPr bwMode="auto">
+          <a:xfrm>
+            <a:off x="1877454" y="2419301"/>
+            <a:ext cx="1401922" cy="1177001"/>
+          </a:xfrm>
+          <a:prstGeom prst="rect">
+            <a:avLst/>
+          </a:prstGeom>
+          <a:noFill/>
+          <a:extLst>
+            <a:ext uri="{909E8E84-426E-40DD-AFC4-6F175D3DCCD1}">
+              <a14:hiddenFill xmlns:a14="http://schemas.microsoft.com/office/drawing/2010/main">
+                <a:solidFill>
+                  <a:srgbClr val="FFFFFF"/>
+                </a:solidFill>
+              </a14:hiddenFill>
+            </a:ext>
+          </a:extLst>
+        </p:spPr>
+      </p:pic>
+      <p:pic>
+        <p:nvPicPr>
+          <p:cNvPr id="7" name="Imagen 6" descr="Texto&#10;&#10;Descripción generada automáticamente">
+            <a:extLst>
+              <a:ext uri="{FF2B5EF4-FFF2-40B4-BE49-F238E27FC236}">
+                <a16:creationId xmlns:a16="http://schemas.microsoft.com/office/drawing/2014/main" id="{BA55B565-BAD4-453E-AACF-0DAC1C99B7D6}"/>
+              </a:ext>
+            </a:extLst>
+          </p:cNvPr>
+          <p:cNvPicPr>
+            <a:picLocks noChangeAspect="1"/>
+          </p:cNvPicPr>
+          <p:nvPr/>
+        </p:nvPicPr>
+        <p:blipFill rotWithShape="1">
+          <a:blip r:embed="rId5">
+            <a:extLst>
+              <a:ext uri="{28A0092B-C50C-407E-A947-70E740481C1C}">
+                <a14:useLocalDpi xmlns:a14="http://schemas.microsoft.com/office/drawing/2010/main" val="0"/>
+              </a:ext>
+            </a:extLst>
+          </a:blip>
+          <a:srcRect r="93265" b="89700"/>
+          <a:stretch/>
+        </p:blipFill>
+        <p:spPr>
+          <a:xfrm>
+            <a:off x="5133975" y="3886521"/>
+            <a:ext cx="779137" cy="893678"/>
+          </a:xfrm>
+          <a:prstGeom prst="rect">
+            <a:avLst/>
+          </a:prstGeom>
+        </p:spPr>
+      </p:pic>
+      <p:pic>
+        <p:nvPicPr>
+          <p:cNvPr id="10" name="Imagen 9">
+            <a:extLst>
+              <a:ext uri="{FF2B5EF4-FFF2-40B4-BE49-F238E27FC236}">
+                <a16:creationId xmlns:a16="http://schemas.microsoft.com/office/drawing/2014/main" id="{8DD1D34A-25BF-4FFA-9DB9-2ADC00F76BEF}"/>
+              </a:ext>
+            </a:extLst>
+          </p:cNvPr>
+          <p:cNvPicPr>
+            <a:picLocks noChangeAspect="1"/>
+          </p:cNvPicPr>
+          <p:nvPr/>
+        </p:nvPicPr>
+        <p:blipFill rotWithShape="1">
+          <a:blip r:embed="rId6">
+            <a:extLst>
+              <a:ext uri="{28A0092B-C50C-407E-A947-70E740481C1C}">
+                <a14:useLocalDpi xmlns:a14="http://schemas.microsoft.com/office/drawing/2010/main" val="0"/>
+              </a:ext>
+            </a:extLst>
+          </a:blip>
+          <a:srcRect r="93075" b="-25298"/>
+          <a:stretch/>
+        </p:blipFill>
+        <p:spPr>
+          <a:xfrm>
+            <a:off x="1144528" y="3158945"/>
+            <a:ext cx="485065" cy="540110"/>
+          </a:xfrm>
+          <a:prstGeom prst="rect">
+            <a:avLst/>
+          </a:prstGeom>
+        </p:spPr>
+      </p:pic>
+      <p:pic>
+        <p:nvPicPr>
+          <p:cNvPr id="12" name="Imagen 11" descr="Imagen de la pantalla de un video juego&#10;&#10;Descripción generada automáticamente con confianza baja">
+            <a:extLst>
+              <a:ext uri="{FF2B5EF4-FFF2-40B4-BE49-F238E27FC236}">
+                <a16:creationId xmlns:a16="http://schemas.microsoft.com/office/drawing/2014/main" id="{653E5E2C-D84E-4118-A87C-3B185FE8E453}"/>
+              </a:ext>
+            </a:extLst>
+          </p:cNvPr>
+          <p:cNvPicPr>
+            <a:picLocks noChangeAspect="1"/>
+          </p:cNvPicPr>
+          <p:nvPr/>
+        </p:nvPicPr>
+        <p:blipFill rotWithShape="1">
+          <a:blip r:embed="rId7">
+            <a:extLst>
+              <a:ext uri="{28A0092B-C50C-407E-A947-70E740481C1C}">
+                <a14:useLocalDpi xmlns:a14="http://schemas.microsoft.com/office/drawing/2010/main" val="0"/>
+              </a:ext>
+            </a:extLst>
+          </a:blip>
+          <a:srcRect l="58381" t="76333" r="32041" b="12082"/>
+          <a:stretch/>
+        </p:blipFill>
+        <p:spPr>
+          <a:xfrm>
+            <a:off x="9055239" y="5167439"/>
+            <a:ext cx="522432" cy="631952"/>
+          </a:xfrm>
+          <a:prstGeom prst="rect">
+            <a:avLst/>
+          </a:prstGeom>
+        </p:spPr>
+      </p:pic>
+    </p:spTree>
+    <p:extLst>
+      <p:ext uri="{BB962C8B-B14F-4D97-AF65-F5344CB8AC3E}">
+        <p14:creationId xmlns:p14="http://schemas.microsoft.com/office/powerpoint/2010/main" val="1501354290"/>
+      </p:ext>
+    </p:extLst>
+  </p:cSld>
+  <p:clrMapOvr>
+    <a:masterClrMapping/>
+  </p:clrMapOvr>
+</p:sld>
+</file>
+
+<file path=ppt/slides/slide5.xml><?xml version="1.0" encoding="utf-8"?>
+<p:sld xmlns:a="http://schemas.openxmlformats.org/drawingml/2006/main" xmlns:r="http://schemas.openxmlformats.org/officeDocument/2006/relationships" xmlns:p="http://schemas.openxmlformats.org/presentationml/2006/main">
+  <p:cSld>
+    <p:spTree>
+      <p:nvGrpSpPr>
+        <p:cNvPr id="1" name=""/>
+        <p:cNvGrpSpPr/>
+        <p:nvPr/>
+      </p:nvGrpSpPr>
+      <p:grpSpPr>
+        <a:xfrm>
+          <a:off x="0" y="0"/>
+          <a:ext cx="0" cy="0"/>
+          <a:chOff x="0" y="0"/>
+          <a:chExt cx="0" cy="0"/>
+        </a:xfrm>
+      </p:grpSpPr>
+      <p:sp>
+        <p:nvSpPr>
+          <p:cNvPr id="2" name="Título 1">
+            <a:extLst>
+              <a:ext uri="{FF2B5EF4-FFF2-40B4-BE49-F238E27FC236}">
                 <a16:creationId xmlns:a16="http://schemas.microsoft.com/office/drawing/2014/main" id="{681885CE-4CEC-474B-8673-864792F12721}"/>
               </a:ext>
             </a:extLst>
@@ -5337,7 +5746,7 @@
 </p:sld>
 </file>
 
-<file path=ppt/slides/slide5.xml><?xml version="1.0" encoding="utf-8"?>
+<file path=ppt/slides/slide6.xml><?xml version="1.0" encoding="utf-8"?>
 <p:sld xmlns:a="http://schemas.openxmlformats.org/drawingml/2006/main" xmlns:r="http://schemas.openxmlformats.org/officeDocument/2006/relationships" xmlns:p="http://schemas.openxmlformats.org/presentationml/2006/main">
   <p:cSld>
     <p:spTree>
@@ -5528,415 +5937,6 @@
     <p:extLst>
       <p:ext uri="{BB962C8B-B14F-4D97-AF65-F5344CB8AC3E}">
         <p14:creationId xmlns:p14="http://schemas.microsoft.com/office/powerpoint/2010/main" val="2357422088"/>
-      </p:ext>
-    </p:extLst>
-  </p:cSld>
-  <p:clrMapOvr>
-    <a:masterClrMapping/>
-  </p:clrMapOvr>
-</p:sld>
-</file>
-
-<file path=ppt/slides/slide6.xml><?xml version="1.0" encoding="utf-8"?>
-<p:sld xmlns:a="http://schemas.openxmlformats.org/drawingml/2006/main" xmlns:r="http://schemas.openxmlformats.org/officeDocument/2006/relationships" xmlns:p="http://schemas.openxmlformats.org/presentationml/2006/main">
-  <p:cSld>
-    <p:spTree>
-      <p:nvGrpSpPr>
-        <p:cNvPr id="1" name=""/>
-        <p:cNvGrpSpPr/>
-        <p:nvPr/>
-      </p:nvGrpSpPr>
-      <p:grpSpPr>
-        <a:xfrm>
-          <a:off x="0" y="0"/>
-          <a:ext cx="0" cy="0"/>
-          <a:chOff x="0" y="0"/>
-          <a:chExt cx="0" cy="0"/>
-        </a:xfrm>
-      </p:grpSpPr>
-      <p:sp>
-        <p:nvSpPr>
-          <p:cNvPr id="2" name="Título 1">
-            <a:extLst>
-              <a:ext uri="{FF2B5EF4-FFF2-40B4-BE49-F238E27FC236}">
-                <a16:creationId xmlns:a16="http://schemas.microsoft.com/office/drawing/2014/main" id="{919C7AAA-C93C-435F-89C9-BBC0E4327853}"/>
-              </a:ext>
-            </a:extLst>
-          </p:cNvPr>
-          <p:cNvSpPr>
-            <a:spLocks noGrp="1"/>
-          </p:cNvSpPr>
-          <p:nvPr>
-            <p:ph type="title"/>
-          </p:nvPr>
-        </p:nvSpPr>
-        <p:spPr/>
-        <p:txBody>
-          <a:bodyPr/>
-          <a:lstStyle/>
-          <a:p>
-            <a:r>
-              <a:rPr lang="es-ES" dirty="0">
-                <a:solidFill>
-                  <a:schemeClr val="bg1"/>
-                </a:solidFill>
-                <a:latin typeface="Stencil" panose="040409050D0802020404" pitchFamily="82" charset="0"/>
-              </a:rPr>
-              <a:t>Personajes</a:t>
-            </a:r>
-            <a:endParaRPr lang="es-ES" dirty="0"/>
-          </a:p>
-        </p:txBody>
-      </p:sp>
-      <p:sp>
-        <p:nvSpPr>
-          <p:cNvPr id="3" name="Marcador de contenido 2">
-            <a:extLst>
-              <a:ext uri="{FF2B5EF4-FFF2-40B4-BE49-F238E27FC236}">
-                <a16:creationId xmlns:a16="http://schemas.microsoft.com/office/drawing/2014/main" id="{42342C9F-20EE-4721-BBE8-737BC53A3F82}"/>
-              </a:ext>
-            </a:extLst>
-          </p:cNvPr>
-          <p:cNvSpPr>
-            <a:spLocks noGrp="1"/>
-          </p:cNvSpPr>
-          <p:nvPr>
-            <p:ph idx="1"/>
-          </p:nvPr>
-        </p:nvSpPr>
-        <p:spPr/>
-        <p:txBody>
-          <a:bodyPr>
-            <a:normAutofit/>
-          </a:bodyPr>
-          <a:lstStyle/>
-          <a:p>
-            <a:pPr marL="0" indent="0">
-              <a:buNone/>
-            </a:pPr>
-            <a:r>
-              <a:rPr lang="es-ES" sz="2400" dirty="0">
-                <a:solidFill>
-                  <a:schemeClr val="bg1"/>
-                </a:solidFill>
-              </a:rPr>
-              <a:t>        </a:t>
-            </a:r>
-            <a:r>
-              <a:rPr lang="es-ES" sz="2400" b="1" dirty="0">
-                <a:solidFill>
-                  <a:schemeClr val="bg1"/>
-                </a:solidFill>
-              </a:rPr>
-              <a:t>MEAT BOY</a:t>
-            </a:r>
-          </a:p>
-          <a:p>
-            <a:pPr marL="0" indent="0">
-              <a:buNone/>
-            </a:pPr>
-            <a:endParaRPr lang="es-ES" sz="2400" dirty="0">
-              <a:solidFill>
-                <a:schemeClr val="bg1"/>
-              </a:solidFill>
-            </a:endParaRPr>
-          </a:p>
-          <a:p>
-            <a:pPr marL="0" indent="0">
-              <a:buNone/>
-            </a:pPr>
-            <a:r>
-              <a:rPr lang="es-ES" sz="2400" dirty="0">
-                <a:solidFill>
-                  <a:schemeClr val="bg1"/>
-                </a:solidFill>
-              </a:rPr>
-              <a:t>				           </a:t>
-            </a:r>
-            <a:r>
-              <a:rPr lang="es-ES" sz="2400" b="1" dirty="0">
-                <a:solidFill>
-                  <a:schemeClr val="bg1"/>
-                </a:solidFill>
-              </a:rPr>
-              <a:t>BANDAGE GIRL</a:t>
-            </a:r>
-          </a:p>
-          <a:p>
-            <a:pPr marL="0" indent="0">
-              <a:buNone/>
-            </a:pPr>
-            <a:r>
-              <a:rPr lang="es-ES" sz="2400" dirty="0">
-                <a:solidFill>
-                  <a:schemeClr val="bg1"/>
-                </a:solidFill>
-              </a:rPr>
-              <a:t>						</a:t>
-            </a:r>
-          </a:p>
-          <a:p>
-            <a:pPr marL="0" indent="0">
-              <a:buNone/>
-            </a:pPr>
-            <a:r>
-              <a:rPr lang="es-ES" sz="2400" dirty="0">
-                <a:solidFill>
-                  <a:schemeClr val="bg1"/>
-                </a:solidFill>
-              </a:rPr>
-              <a:t>									     </a:t>
-            </a:r>
-            <a:r>
-              <a:rPr lang="es-ES" sz="2400" b="1" dirty="0">
-                <a:solidFill>
-                  <a:schemeClr val="bg1"/>
-                </a:solidFill>
-              </a:rPr>
-              <a:t>DR. FETUS</a:t>
-            </a:r>
-          </a:p>
-        </p:txBody>
-      </p:sp>
-      <p:pic>
-        <p:nvPicPr>
-          <p:cNvPr id="5" name="Imagen 4">
-            <a:extLst>
-              <a:ext uri="{FF2B5EF4-FFF2-40B4-BE49-F238E27FC236}">
-                <a16:creationId xmlns:a16="http://schemas.microsoft.com/office/drawing/2014/main" id="{7B1E86C4-78BE-4C2D-B464-31910B502DA2}"/>
-              </a:ext>
-            </a:extLst>
-          </p:cNvPr>
-          <p:cNvPicPr>
-            <a:picLocks noChangeAspect="1"/>
-          </p:cNvPicPr>
-          <p:nvPr/>
-        </p:nvPicPr>
-        <p:blipFill>
-          <a:blip r:embed="rId2">
-            <a:extLst>
-              <a:ext uri="{28A0092B-C50C-407E-A947-70E740481C1C}">
-                <a14:useLocalDpi xmlns:a14="http://schemas.microsoft.com/office/drawing/2010/main" val="0"/>
-              </a:ext>
-            </a:extLst>
-          </a:blip>
-          <a:stretch>
-            <a:fillRect/>
-          </a:stretch>
-        </p:blipFill>
-        <p:spPr>
-          <a:xfrm>
-            <a:off x="5925368" y="3206694"/>
-            <a:ext cx="1401923" cy="1359654"/>
-          </a:xfrm>
-          <a:prstGeom prst="rect">
-            <a:avLst/>
-          </a:prstGeom>
-        </p:spPr>
-      </p:pic>
-      <p:pic>
-        <p:nvPicPr>
-          <p:cNvPr id="1028" name="Picture 4" descr="Dr. Fetus">
-            <a:extLst>
-              <a:ext uri="{FF2B5EF4-FFF2-40B4-BE49-F238E27FC236}">
-                <a16:creationId xmlns:a16="http://schemas.microsoft.com/office/drawing/2014/main" id="{4E6EFF35-3741-4833-B37E-736A52411728}"/>
-              </a:ext>
-            </a:extLst>
-          </p:cNvPr>
-          <p:cNvPicPr>
-            <a:picLocks noChangeAspect="1" noChangeArrowheads="1"/>
-          </p:cNvPicPr>
-          <p:nvPr/>
-        </p:nvPicPr>
-        <p:blipFill>
-          <a:blip r:embed="rId3">
-            <a:extLst>
-              <a:ext uri="{28A0092B-C50C-407E-A947-70E740481C1C}">
-                <a14:useLocalDpi xmlns:a14="http://schemas.microsoft.com/office/drawing/2010/main" val="0"/>
-              </a:ext>
-            </a:extLst>
-          </a:blip>
-          <a:srcRect/>
-          <a:stretch>
-            <a:fillRect/>
-          </a:stretch>
-        </p:blipFill>
-        <p:spPr bwMode="auto">
-          <a:xfrm>
-            <a:off x="9645791" y="4254311"/>
-            <a:ext cx="1619625" cy="1619625"/>
-          </a:xfrm>
-          <a:prstGeom prst="rect">
-            <a:avLst/>
-          </a:prstGeom>
-          <a:noFill/>
-          <a:extLst>
-            <a:ext uri="{909E8E84-426E-40DD-AFC4-6F175D3DCCD1}">
-              <a14:hiddenFill xmlns:a14="http://schemas.microsoft.com/office/drawing/2010/main">
-                <a:solidFill>
-                  <a:srgbClr val="FFFFFF"/>
-                </a:solidFill>
-              </a14:hiddenFill>
-            </a:ext>
-          </a:extLst>
-        </p:spPr>
-      </p:pic>
-      <p:pic>
-        <p:nvPicPr>
-          <p:cNvPr id="8" name="Picture 2">
-            <a:extLst>
-              <a:ext uri="{FF2B5EF4-FFF2-40B4-BE49-F238E27FC236}">
-                <a16:creationId xmlns:a16="http://schemas.microsoft.com/office/drawing/2014/main" id="{7264CC92-1D3F-4A05-A377-1FEFE0585C90}"/>
-              </a:ext>
-            </a:extLst>
-          </p:cNvPr>
-          <p:cNvPicPr>
-            <a:picLocks noChangeAspect="1" noChangeArrowheads="1"/>
-          </p:cNvPicPr>
-          <p:nvPr/>
-        </p:nvPicPr>
-        <p:blipFill>
-          <a:blip r:embed="rId4">
-            <a:extLst>
-              <a:ext uri="{28A0092B-C50C-407E-A947-70E740481C1C}">
-                <a14:useLocalDpi xmlns:a14="http://schemas.microsoft.com/office/drawing/2010/main" val="0"/>
-              </a:ext>
-            </a:extLst>
-          </a:blip>
-          <a:srcRect/>
-          <a:stretch>
-            <a:fillRect/>
-          </a:stretch>
-        </p:blipFill>
-        <p:spPr bwMode="auto">
-          <a:xfrm>
-            <a:off x="1877454" y="2419301"/>
-            <a:ext cx="1401922" cy="1177001"/>
-          </a:xfrm>
-          <a:prstGeom prst="rect">
-            <a:avLst/>
-          </a:prstGeom>
-          <a:noFill/>
-          <a:extLst>
-            <a:ext uri="{909E8E84-426E-40DD-AFC4-6F175D3DCCD1}">
-              <a14:hiddenFill xmlns:a14="http://schemas.microsoft.com/office/drawing/2010/main">
-                <a:solidFill>
-                  <a:srgbClr val="FFFFFF"/>
-                </a:solidFill>
-              </a14:hiddenFill>
-            </a:ext>
-          </a:extLst>
-        </p:spPr>
-      </p:pic>
-      <p:pic>
-        <p:nvPicPr>
-          <p:cNvPr id="7" name="Imagen 6" descr="Texto&#10;&#10;Descripción generada automáticamente">
-            <a:extLst>
-              <a:ext uri="{FF2B5EF4-FFF2-40B4-BE49-F238E27FC236}">
-                <a16:creationId xmlns:a16="http://schemas.microsoft.com/office/drawing/2014/main" id="{BA55B565-BAD4-453E-AACF-0DAC1C99B7D6}"/>
-              </a:ext>
-            </a:extLst>
-          </p:cNvPr>
-          <p:cNvPicPr>
-            <a:picLocks noChangeAspect="1"/>
-          </p:cNvPicPr>
-          <p:nvPr/>
-        </p:nvPicPr>
-        <p:blipFill rotWithShape="1">
-          <a:blip r:embed="rId5">
-            <a:extLst>
-              <a:ext uri="{28A0092B-C50C-407E-A947-70E740481C1C}">
-                <a14:useLocalDpi xmlns:a14="http://schemas.microsoft.com/office/drawing/2010/main" val="0"/>
-              </a:ext>
-            </a:extLst>
-          </a:blip>
-          <a:srcRect r="93265" b="89700"/>
-          <a:stretch/>
-        </p:blipFill>
-        <p:spPr>
-          <a:xfrm>
-            <a:off x="5133975" y="3886521"/>
-            <a:ext cx="779137" cy="893678"/>
-          </a:xfrm>
-          <a:prstGeom prst="rect">
-            <a:avLst/>
-          </a:prstGeom>
-        </p:spPr>
-      </p:pic>
-      <p:pic>
-        <p:nvPicPr>
-          <p:cNvPr id="10" name="Imagen 9">
-            <a:extLst>
-              <a:ext uri="{FF2B5EF4-FFF2-40B4-BE49-F238E27FC236}">
-                <a16:creationId xmlns:a16="http://schemas.microsoft.com/office/drawing/2014/main" id="{8DD1D34A-25BF-4FFA-9DB9-2ADC00F76BEF}"/>
-              </a:ext>
-            </a:extLst>
-          </p:cNvPr>
-          <p:cNvPicPr>
-            <a:picLocks noChangeAspect="1"/>
-          </p:cNvPicPr>
-          <p:nvPr/>
-        </p:nvPicPr>
-        <p:blipFill rotWithShape="1">
-          <a:blip r:embed="rId6">
-            <a:extLst>
-              <a:ext uri="{28A0092B-C50C-407E-A947-70E740481C1C}">
-                <a14:useLocalDpi xmlns:a14="http://schemas.microsoft.com/office/drawing/2010/main" val="0"/>
-              </a:ext>
-            </a:extLst>
-          </a:blip>
-          <a:srcRect r="93075" b="-25298"/>
-          <a:stretch/>
-        </p:blipFill>
-        <p:spPr>
-          <a:xfrm>
-            <a:off x="1144528" y="3158945"/>
-            <a:ext cx="485065" cy="540110"/>
-          </a:xfrm>
-          <a:prstGeom prst="rect">
-            <a:avLst/>
-          </a:prstGeom>
-        </p:spPr>
-      </p:pic>
-      <p:pic>
-        <p:nvPicPr>
-          <p:cNvPr id="12" name="Imagen 11" descr="Imagen de la pantalla de un video juego&#10;&#10;Descripción generada automáticamente con confianza baja">
-            <a:extLst>
-              <a:ext uri="{FF2B5EF4-FFF2-40B4-BE49-F238E27FC236}">
-                <a16:creationId xmlns:a16="http://schemas.microsoft.com/office/drawing/2014/main" id="{653E5E2C-D84E-4118-A87C-3B185FE8E453}"/>
-              </a:ext>
-            </a:extLst>
-          </p:cNvPr>
-          <p:cNvPicPr>
-            <a:picLocks noChangeAspect="1"/>
-          </p:cNvPicPr>
-          <p:nvPr/>
-        </p:nvPicPr>
-        <p:blipFill rotWithShape="1">
-          <a:blip r:embed="rId7">
-            <a:extLst>
-              <a:ext uri="{28A0092B-C50C-407E-A947-70E740481C1C}">
-                <a14:useLocalDpi xmlns:a14="http://schemas.microsoft.com/office/drawing/2010/main" val="0"/>
-              </a:ext>
-            </a:extLst>
-          </a:blip>
-          <a:srcRect l="58381" t="76333" r="32041" b="12082"/>
-          <a:stretch/>
-        </p:blipFill>
-        <p:spPr>
-          <a:xfrm>
-            <a:off x="9055239" y="5167439"/>
-            <a:ext cx="522432" cy="631952"/>
-          </a:xfrm>
-          <a:prstGeom prst="rect">
-            <a:avLst/>
-          </a:prstGeom>
-        </p:spPr>
-      </p:pic>
-    </p:spTree>
-    <p:extLst>
-      <p:ext uri="{BB962C8B-B14F-4D97-AF65-F5344CB8AC3E}">
-        <p14:creationId xmlns:p14="http://schemas.microsoft.com/office/powerpoint/2010/main" val="1501354290"/>
       </p:ext>
     </p:extLst>
   </p:cSld>
@@ -6528,7 +6528,7 @@
                   <a:schemeClr val="bg1"/>
                 </a:solidFill>
               </a:rPr>
-              <a:t>Diferentes de animaciones .</a:t>
+              <a:t>Diferentes animaciones .</a:t>
             </a:r>
           </a:p>
         </p:txBody>
@@ -7824,14 +7824,14 @@
 <ds:datastoreItem xmlns:ds="http://schemas.openxmlformats.org/officeDocument/2006/customXml" ds:itemID="{22882BB0-EEAF-42F9-8DEC-471BBDC5C38C}">
   <ds:schemaRefs>
     <ds:schemaRef ds:uri="http://schemas.openxmlformats.org/package/2006/metadata/core-properties"/>
+    <ds:schemaRef ds:uri="http://www.w3.org/XML/1998/namespace"/>
+    <ds:schemaRef ds:uri="http://schemas.microsoft.com/office/2006/documentManagement/types"/>
+    <ds:schemaRef ds:uri="1ee2205b-b944-464a-8e9f-b2a34e5e2637"/>
     <ds:schemaRef ds:uri="http://schemas.microsoft.com/office/2006/metadata/properties"/>
-    <ds:schemaRef ds:uri="http://purl.org/dc/terms/"/>
-    <ds:schemaRef ds:uri="http://www.w3.org/XML/1998/namespace"/>
-    <ds:schemaRef ds:uri="1ee2205b-b944-464a-8e9f-b2a34e5e2637"/>
-    <ds:schemaRef ds:uri="http://purl.org/dc/dcmitype/"/>
-    <ds:schemaRef ds:uri="http://schemas.microsoft.com/office/2006/documentManagement/types"/>
     <ds:schemaRef ds:uri="http://schemas.microsoft.com/office/infopath/2007/PartnerControls"/>
     <ds:schemaRef ds:uri="http://purl.org/dc/elements/1.1/"/>
+    <ds:schemaRef ds:uri="http://purl.org/dc/dcmitype/"/>
+    <ds:schemaRef ds:uri="http://purl.org/dc/terms/"/>
   </ds:schemaRefs>
 </ds:datastoreItem>
 </file>

</xml_diff>